<commit_message>
minor formatting.  Fixed package names on cucumber slides
</commit_message>
<xml_diff>
--- a/SpringOne2GX_2014_HolyIntegrationTest.pptx
+++ b/SpringOne2GX_2014_HolyIntegrationTest.pptx
@@ -488,11 +488,11 @@
           <c:showBubbleSize val="0"/>
         </c:dLbls>
         <c:gapWidth val="150"/>
-        <c:axId val="2127154808"/>
-        <c:axId val="2126765080"/>
+        <c:axId val="-2075558648"/>
+        <c:axId val="-2075555208"/>
       </c:barChart>
       <c:catAx>
-        <c:axId val="2127154808"/>
+        <c:axId val="-2075558648"/>
         <c:scaling>
           <c:orientation val="minMax"/>
         </c:scaling>
@@ -511,7 +511,7 @@
             </a:solidFill>
           </a:ln>
         </c:spPr>
-        <c:crossAx val="2126765080"/>
+        <c:crossAx val="-2075555208"/>
         <c:crosses val="autoZero"/>
         <c:auto val="1"/>
         <c:lblAlgn val="ctr"/>
@@ -519,7 +519,7 @@
         <c:noMultiLvlLbl val="0"/>
       </c:catAx>
       <c:valAx>
-        <c:axId val="2126765080"/>
+        <c:axId val="-2075555208"/>
         <c:scaling>
           <c:orientation val="minMax"/>
         </c:scaling>
@@ -543,7 +543,7 @@
             <a:noFill/>
           </a:ln>
         </c:spPr>
-        <c:crossAx val="2127154808"/>
+        <c:crossAx val="-2075558648"/>
         <c:crosses val="autoZero"/>
         <c:crossBetween val="between"/>
         <c:majorUnit val="20.0"/>
@@ -881,11 +881,11 @@
         </c:dLbls>
         <c:marker val="1"/>
         <c:smooth val="0"/>
-        <c:axId val="2126932072"/>
-        <c:axId val="2127148264"/>
+        <c:axId val="-2075414696"/>
+        <c:axId val="-2075457272"/>
       </c:lineChart>
       <c:catAx>
-        <c:axId val="2126932072"/>
+        <c:axId val="-2075414696"/>
         <c:scaling>
           <c:orientation val="minMax"/>
         </c:scaling>
@@ -904,7 +904,7 @@
             </a:solidFill>
           </a:ln>
         </c:spPr>
-        <c:crossAx val="2127148264"/>
+        <c:crossAx val="-2075457272"/>
         <c:crosses val="autoZero"/>
         <c:auto val="1"/>
         <c:lblAlgn val="ctr"/>
@@ -912,7 +912,7 @@
         <c:noMultiLvlLbl val="0"/>
       </c:catAx>
       <c:valAx>
-        <c:axId val="2127148264"/>
+        <c:axId val="-2075457272"/>
         <c:scaling>
           <c:orientation val="minMax"/>
         </c:scaling>
@@ -936,7 +936,7 @@
             <a:noFill/>
           </a:ln>
         </c:spPr>
-        <c:crossAx val="2126932072"/>
+        <c:crossAx val="-2075414696"/>
         <c:crosses val="autoZero"/>
         <c:crossBetween val="between"/>
       </c:valAx>
@@ -25934,7 +25934,7 @@
             <a:pPr marL="857250" lvl="1" indent="-457200"/>
             <a:r>
               <a:rPr lang="en-US" dirty="0" err="1" smtClean="0"/>
-              <a:t>org.demo.ApplicationTests.java</a:t>
+              <a:t>org.demo.integration.bdd.ApplicationTests.java</a:t>
             </a:r>
             <a:endParaRPr lang="en-US" dirty="0" smtClean="0"/>
           </a:p>
@@ -26594,7 +26594,19 @@
             <a:pPr marL="857250" lvl="1" indent="-457200"/>
             <a:r>
               <a:rPr lang="en-US" dirty="0" smtClean="0"/>
-              <a:t>org/demo/</a:t>
+              <a:t>org/demo</a:t>
+            </a:r>
+            <a:r>
+              <a:rPr lang="en-US" dirty="0" smtClean="0"/>
+              <a:t>/integration/</a:t>
+            </a:r>
+            <a:r>
+              <a:rPr lang="en-US" dirty="0" err="1" smtClean="0"/>
+              <a:t>bdd</a:t>
+            </a:r>
+            <a:r>
+              <a:rPr lang="en-US" dirty="0" smtClean="0"/>
+              <a:t>/</a:t>
             </a:r>
             <a:r>
               <a:rPr lang="en-US" dirty="0" err="1" smtClean="0"/>
@@ -26821,16 +26833,13 @@
             <a:pPr marL="857250" lvl="1" indent="-457200"/>
             <a:r>
               <a:rPr lang="en-US" dirty="0" smtClean="0"/>
-              <a:t>This is where Spring MVC Test and </a:t>
-            </a:r>
-            <a:r>
-              <a:rPr lang="en-US" dirty="0" err="1" smtClean="0"/>
-              <a:t>HtmlUnit</a:t>
+              <a:t>This is where </a:t>
             </a:r>
             <a:r>
               <a:rPr lang="en-US" dirty="0" smtClean="0"/>
-              <a:t> come in:</a:t>
-            </a:r>
+              <a:t>text file maps to Java code:</a:t>
+            </a:r>
+            <a:endParaRPr lang="en-US" dirty="0" smtClean="0"/>
           </a:p>
         </p:txBody>
       </p:sp>

</xml_diff>